<commit_message>
Add degree symbol and remove diagram border.
</commit_message>
<xml_diff>
--- a/Paper/fig/Map_1_and_7_C_distance.pptx
+++ b/Paper/fig/Map_1_and_7_C_distance.pptx
@@ -106,7 +106,7 @@
   </p:defaultTextStyle>
   <p:extLst>
     <p:ext uri="{EFAFB233-063F-42B5-8137-9DF3F51BA10A}">
-      <p15:sldGuideLst xmlns:p15="http://schemas.microsoft.com/office/powerpoint/2012/main">
+      <p15:sldGuideLst xmlns:p15="http://schemas.microsoft.com/office/powerpoint/2012/main" xmlns="">
         <p15:guide id="1" orient="horz" pos="2160">
           <p15:clr>
             <a:srgbClr val="A4A3A4"/>
@@ -121,6 +121,1953 @@
     </p:ext>
   </p:extLst>
 </p:presentation>
+</file>
+
+<file path=ppt/charts/chart1.xml><?xml version="1.0" encoding="utf-8"?>
+<c:chartSpace xmlns:c="http://schemas.openxmlformats.org/drawingml/2006/chart" xmlns:a="http://schemas.openxmlformats.org/drawingml/2006/main" xmlns:r="http://schemas.openxmlformats.org/officeDocument/2006/relationships">
+  <c:date1904 val="0"/>
+  <c:lang val="en-US"/>
+  <c:roundedCorners val="0"/>
+  <mc:AlternateContent xmlns:mc="http://schemas.openxmlformats.org/markup-compatibility/2006">
+    <mc:Choice xmlns:c14="http://schemas.microsoft.com/office/drawing/2007/8/2/chart" Requires="c14">
+      <c14:style val="102"/>
+    </mc:Choice>
+    <mc:Fallback>
+      <c:style val="2"/>
+    </mc:Fallback>
+  </mc:AlternateContent>
+  <c:chart>
+    <c:autoTitleDeleted val="0"/>
+    <c:plotArea>
+      <c:layout>
+        <c:manualLayout>
+          <c:layoutTarget val="inner"/>
+          <c:xMode val="edge"/>
+          <c:yMode val="edge"/>
+          <c:x val="0.2094504593175853"/>
+          <c:y val="5.4398148148148147E-2"/>
+          <c:w val="0.72687718722659667"/>
+          <c:h val="0.65442949839603382"/>
+        </c:manualLayout>
+      </c:layout>
+      <c:scatterChart>
+        <c:scatterStyle val="lineMarker"/>
+        <c:varyColors val="0"/>
+        <c:ser>
+          <c:idx val="0"/>
+          <c:order val="0"/>
+          <c:tx>
+            <c:v>Map 1</c:v>
+          </c:tx>
+          <c:spPr>
+            <a:ln w="28575">
+              <a:noFill/>
+            </a:ln>
+          </c:spPr>
+          <c:marker>
+            <c:symbol val="diamond"/>
+            <c:size val="20"/>
+            <c:spPr>
+              <a:solidFill>
+                <a:srgbClr val="4F81BD">
+                  <a:alpha val="50196"/>
+                </a:srgbClr>
+              </a:solidFill>
+              <a:ln>
+                <a:solidFill>
+                  <a:schemeClr val="accent1">
+                    <a:alpha val="50000"/>
+                  </a:schemeClr>
+                </a:solidFill>
+              </a:ln>
+            </c:spPr>
+          </c:marker>
+          <c:xVal>
+            <c:numRef>
+              <c:f>'Map 1_all_result'!$R$2:$R$136</c:f>
+              <c:numCache>
+                <c:formatCode>0.00E+00</c:formatCode>
+                <c:ptCount val="135"/>
+                <c:pt idx="0">
+                  <c:v>11.114755555555554</c:v>
+                </c:pt>
+                <c:pt idx="1">
+                  <c:v>9.2987555555555552E-3</c:v>
+                </c:pt>
+                <c:pt idx="2">
+                  <c:v>2.1797555555555556E-2</c:v>
+                </c:pt>
+                <c:pt idx="3">
+                  <c:v>1.9153199999999999E-2</c:v>
+                </c:pt>
+                <c:pt idx="4">
+                  <c:v>8.6217333333333326E-3</c:v>
+                </c:pt>
+                <c:pt idx="5">
+                  <c:v>2.1883155555555554E-2</c:v>
+                </c:pt>
+                <c:pt idx="6">
+                  <c:v>9.7064888888888888E-3</c:v>
+                </c:pt>
+                <c:pt idx="7">
+                  <c:v>4.0175822222222227E-2</c:v>
+                </c:pt>
+                <c:pt idx="8">
+                  <c:v>2.079591111111111E-2</c:v>
+                </c:pt>
+                <c:pt idx="9">
+                  <c:v>11.114755555555554</c:v>
+                </c:pt>
+                <c:pt idx="10">
+                  <c:v>5.9461777777777784E-3</c:v>
+                </c:pt>
+                <c:pt idx="11">
+                  <c:v>3.0036444444444445E-2</c:v>
+                </c:pt>
+                <c:pt idx="12">
+                  <c:v>11.11751111111111</c:v>
+                </c:pt>
+                <c:pt idx="13">
+                  <c:v>2.2308088888888888</c:v>
+                </c:pt>
+                <c:pt idx="14">
+                  <c:v>2.2291466666666668</c:v>
+                </c:pt>
+                <c:pt idx="15">
+                  <c:v>6.6720444444444444</c:v>
+                </c:pt>
+                <c:pt idx="16">
+                  <c:v>2.2235911111111109</c:v>
+                </c:pt>
+                <c:pt idx="17">
+                  <c:v>4.4355777777777776</c:v>
+                </c:pt>
+                <c:pt idx="18">
+                  <c:v>2.2209644444444443</c:v>
+                </c:pt>
+                <c:pt idx="19">
+                  <c:v>1.3520533333333333E-2</c:v>
+                </c:pt>
+                <c:pt idx="20">
+                  <c:v>9.790533333333332E-3</c:v>
+                </c:pt>
+                <c:pt idx="21">
+                  <c:v>1.9990577777777779E-2</c:v>
+                </c:pt>
+                <c:pt idx="22">
+                  <c:v>8.1238222222222226E-3</c:v>
+                </c:pt>
+                <c:pt idx="23">
+                  <c:v>11.114755555555554</c:v>
+                </c:pt>
+                <c:pt idx="24">
+                  <c:v>8.8733333333333331</c:v>
+                </c:pt>
+                <c:pt idx="25">
+                  <c:v>6.672533333333333</c:v>
+                </c:pt>
+                <c:pt idx="26">
+                  <c:v>4.4499999999999993</c:v>
+                </c:pt>
+                <c:pt idx="27">
+                  <c:v>2.2171911111111111</c:v>
+                </c:pt>
+                <c:pt idx="28">
+                  <c:v>1.6340266666666669E-2</c:v>
+                </c:pt>
+                <c:pt idx="29">
+                  <c:v>2.1547155555555555E-2</c:v>
+                </c:pt>
+                <c:pt idx="30">
+                  <c:v>5.9461777777777784E-3</c:v>
+                </c:pt>
+                <c:pt idx="31">
+                  <c:v>1.6436977777777778E-2</c:v>
+                </c:pt>
+                <c:pt idx="32">
+                  <c:v>1.6173466666666667E-2</c:v>
+                </c:pt>
+                <c:pt idx="33">
+                  <c:v>2.3638844444444446E-2</c:v>
+                </c:pt>
+                <c:pt idx="34">
+                  <c:v>2.7122755555555558E-2</c:v>
+                </c:pt>
+                <c:pt idx="35">
+                  <c:v>7.4523555555555555E-3</c:v>
+                </c:pt>
+                <c:pt idx="36">
+                  <c:v>9.2987555555555552E-3</c:v>
+                </c:pt>
+                <c:pt idx="37">
+                  <c:v>1.3152888888888888E-2</c:v>
+                </c:pt>
+                <c:pt idx="38">
+                  <c:v>3.0036444444444445E-2</c:v>
+                </c:pt>
+                <c:pt idx="39">
+                  <c:v>11.106400000000001</c:v>
+                </c:pt>
+                <c:pt idx="40">
+                  <c:v>8.9006222222222213</c:v>
+                </c:pt>
+                <c:pt idx="41">
+                  <c:v>6.6627111111111113</c:v>
+                </c:pt>
+                <c:pt idx="42">
+                  <c:v>4.4503555555555554</c:v>
+                </c:pt>
+                <c:pt idx="43">
+                  <c:v>2.2167511111111109</c:v>
+                </c:pt>
+                <c:pt idx="44">
+                  <c:v>2.1797555555555556E-2</c:v>
+                </c:pt>
+                <c:pt idx="45">
+                  <c:v>3.2925555555555555E-2</c:v>
+                </c:pt>
+                <c:pt idx="46">
+                  <c:v>2.7050088888888889E-2</c:v>
+                </c:pt>
+                <c:pt idx="47">
+                  <c:v>2.1504088888888891E-2</c:v>
+                </c:pt>
+                <c:pt idx="48">
+                  <c:v>2.2137644444444446</c:v>
+                </c:pt>
+                <c:pt idx="49">
+                  <c:v>1.908591111111111E-2</c:v>
+                </c:pt>
+                <c:pt idx="50">
+                  <c:v>1.9153199999999999E-2</c:v>
+                </c:pt>
+                <c:pt idx="51">
+                  <c:v>2.2019066666666669</c:v>
+                </c:pt>
+                <c:pt idx="52">
+                  <c:v>1.1195511111111112E-2</c:v>
+                </c:pt>
+                <c:pt idx="53">
+                  <c:v>1.2502355555555556E-2</c:v>
+                </c:pt>
+                <c:pt idx="54">
+                  <c:v>1.2623688888888889E-2</c:v>
+                </c:pt>
+                <c:pt idx="55">
+                  <c:v>11.11751111111111</c:v>
+                </c:pt>
+                <c:pt idx="56">
+                  <c:v>8.8741777777777777</c:v>
+                </c:pt>
+                <c:pt idx="57">
+                  <c:v>6.6447555555555553</c:v>
+                </c:pt>
+                <c:pt idx="58">
+                  <c:v>4.4437511111111112</c:v>
+                </c:pt>
+                <c:pt idx="59">
+                  <c:v>2.234097777777778</c:v>
+                </c:pt>
+                <c:pt idx="60">
+                  <c:v>1.4476577777777777E-2</c:v>
+                </c:pt>
+                <c:pt idx="61">
+                  <c:v>2.9423644444444445E-2</c:v>
+                </c:pt>
+                <c:pt idx="62">
+                  <c:v>2.2217244444444444</c:v>
+                </c:pt>
+                <c:pt idx="63">
+                  <c:v>4.3533288888888889E-2</c:v>
+                </c:pt>
+                <c:pt idx="64">
+                  <c:v>2.0348933333333333E-2</c:v>
+                </c:pt>
+                <c:pt idx="65">
+                  <c:v>1.1399733333333334E-2</c:v>
+                </c:pt>
+                <c:pt idx="66">
+                  <c:v>2.2205377777777775</c:v>
+                </c:pt>
+                <c:pt idx="67">
+                  <c:v>9.7900444444444443E-3</c:v>
+                </c:pt>
+                <c:pt idx="68">
+                  <c:v>8.6217333333333326E-3</c:v>
+                </c:pt>
+                <c:pt idx="69">
+                  <c:v>2.20804</c:v>
+                </c:pt>
+                <c:pt idx="70">
+                  <c:v>3.6156711111111108E-2</c:v>
+                </c:pt>
+                <c:pt idx="71">
+                  <c:v>8.8688000000000002</c:v>
+                </c:pt>
+                <c:pt idx="72">
+                  <c:v>6.6527111111111115</c:v>
+                </c:pt>
+                <c:pt idx="73">
+                  <c:v>4.4473777777777777</c:v>
+                </c:pt>
+                <c:pt idx="74">
+                  <c:v>2.2107777777777775</c:v>
+                </c:pt>
+                <c:pt idx="75">
+                  <c:v>2.0675911111111112E-2</c:v>
+                </c:pt>
+                <c:pt idx="76">
+                  <c:v>9.0154222222222219E-3</c:v>
+                </c:pt>
+                <c:pt idx="77">
+                  <c:v>2.708E-2</c:v>
+                </c:pt>
+                <c:pt idx="78">
+                  <c:v>2.2308088888888888</c:v>
+                </c:pt>
+                <c:pt idx="79">
+                  <c:v>2.2291466666666668</c:v>
+                </c:pt>
+                <c:pt idx="80">
+                  <c:v>2.1883155555555554E-2</c:v>
+                </c:pt>
+                <c:pt idx="81">
+                  <c:v>1.6027511111111111E-2</c:v>
+                </c:pt>
+                <c:pt idx="82">
+                  <c:v>2.2113244444444446</c:v>
+                </c:pt>
+                <c:pt idx="83">
+                  <c:v>9.7064888888888888E-3</c:v>
+                </c:pt>
+                <c:pt idx="84">
+                  <c:v>1.2567466666666667E-2</c:v>
+                </c:pt>
+                <c:pt idx="85">
+                  <c:v>2.3863244444444445E-2</c:v>
+                </c:pt>
+                <c:pt idx="86">
+                  <c:v>6.6720444444444444</c:v>
+                </c:pt>
+                <c:pt idx="87">
+                  <c:v>4.4502222222222221</c:v>
+                </c:pt>
+                <c:pt idx="88">
+                  <c:v>2.2360844444444443</c:v>
+                </c:pt>
+                <c:pt idx="89">
+                  <c:v>1.1458266666666668E-2</c:v>
+                </c:pt>
+                <c:pt idx="90">
+                  <c:v>2.2164177777777776</c:v>
+                </c:pt>
+                <c:pt idx="91">
+                  <c:v>6.1706666666666672E-3</c:v>
+                </c:pt>
+                <c:pt idx="92">
+                  <c:v>2.2235911111111109</c:v>
+                </c:pt>
+                <c:pt idx="93">
+                  <c:v>4.4355777777777776</c:v>
+                </c:pt>
+                <c:pt idx="94">
+                  <c:v>2.2209644444444443</c:v>
+                </c:pt>
+                <c:pt idx="95">
+                  <c:v>2.2788088888888889E-3</c:v>
+                </c:pt>
+                <c:pt idx="96">
+                  <c:v>3.2588577777777773E-2</c:v>
+                </c:pt>
+                <c:pt idx="97">
+                  <c:v>4.0175822222222227E-2</c:v>
+                </c:pt>
+                <c:pt idx="98">
+                  <c:v>2.2065333333333332</c:v>
+                </c:pt>
+                <c:pt idx="99">
+                  <c:v>1.3520533333333333E-2</c:v>
+                </c:pt>
+                <c:pt idx="100">
+                  <c:v>4.4374044444444438</c:v>
+                </c:pt>
+                <c:pt idx="101">
+                  <c:v>2.209791111111111</c:v>
+                </c:pt>
+                <c:pt idx="102">
+                  <c:v>1.1431466666666666E-2</c:v>
+                </c:pt>
+                <c:pt idx="103">
+                  <c:v>1.1482222222222222E-2</c:v>
+                </c:pt>
+                <c:pt idx="104">
+                  <c:v>2.214377777777778</c:v>
+                </c:pt>
+                <c:pt idx="105">
+                  <c:v>3.1447911111111108E-2</c:v>
+                </c:pt>
+                <c:pt idx="106">
+                  <c:v>3.4337333333333331E-2</c:v>
+                </c:pt>
+                <c:pt idx="107">
+                  <c:v>1.1724755555555556E-2</c:v>
+                </c:pt>
+                <c:pt idx="108">
+                  <c:v>2.2278044444444443E-2</c:v>
+                </c:pt>
+                <c:pt idx="109">
+                  <c:v>2.1965955555555556</c:v>
+                </c:pt>
+                <c:pt idx="110">
+                  <c:v>2.079591111111111E-2</c:v>
+                </c:pt>
+                <c:pt idx="111">
+                  <c:v>4.9022666666666666E-2</c:v>
+                </c:pt>
+                <c:pt idx="112">
+                  <c:v>3.1507155555555555E-2</c:v>
+                </c:pt>
+                <c:pt idx="113">
+                  <c:v>2.2207022222222221</c:v>
+                </c:pt>
+                <c:pt idx="114">
+                  <c:v>3.8455644444444444E-2</c:v>
+                </c:pt>
+                <c:pt idx="115">
+                  <c:v>2.1055022222222223E-2</c:v>
+                </c:pt>
+                <c:pt idx="116">
+                  <c:v>2.4413866666666666E-2</c:v>
+                </c:pt>
+                <c:pt idx="117">
+                  <c:v>4.6103555555555557E-2</c:v>
+                </c:pt>
+                <c:pt idx="118">
+                  <c:v>1.5476266666666667E-2</c:v>
+                </c:pt>
+                <c:pt idx="119">
+                  <c:v>2.2219600000000002</c:v>
+                </c:pt>
+                <c:pt idx="120">
+                  <c:v>2.4043733333333331E-2</c:v>
+                </c:pt>
+                <c:pt idx="121">
+                  <c:v>2.4698755555555556E-2</c:v>
+                </c:pt>
+                <c:pt idx="122">
+                  <c:v>3.1375733333333336E-2</c:v>
+                </c:pt>
+                <c:pt idx="123">
+                  <c:v>2.2067911111111109</c:v>
+                </c:pt>
+                <c:pt idx="124">
+                  <c:v>3.1373555555555557E-2</c:v>
+                </c:pt>
+                <c:pt idx="125">
+                  <c:v>9.790533333333332E-3</c:v>
+                </c:pt>
+                <c:pt idx="126">
+                  <c:v>3.8899155555555558E-2</c:v>
+                </c:pt>
+                <c:pt idx="127">
+                  <c:v>1.6402666666666666E-2</c:v>
+                </c:pt>
+                <c:pt idx="128">
+                  <c:v>3.4362355555555557E-2</c:v>
+                </c:pt>
+                <c:pt idx="129">
+                  <c:v>1.9990577777777779E-2</c:v>
+                </c:pt>
+                <c:pt idx="130">
+                  <c:v>9.7964444444444444E-3</c:v>
+                </c:pt>
+                <c:pt idx="131">
+                  <c:v>7.2211555555555564E-3</c:v>
+                </c:pt>
+                <c:pt idx="132">
+                  <c:v>1.9758666666666667E-2</c:v>
+                </c:pt>
+                <c:pt idx="133">
+                  <c:v>1.6789644444444446E-2</c:v>
+                </c:pt>
+                <c:pt idx="134">
+                  <c:v>8.1238222222222226E-3</c:v>
+                </c:pt>
+              </c:numCache>
+            </c:numRef>
+          </c:xVal>
+          <c:yVal>
+            <c:numRef>
+              <c:f>'Map 1_all_result'!$Q$2:$Q$136</c:f>
+              <c:numCache>
+                <c:formatCode>0%</c:formatCode>
+                <c:ptCount val="135"/>
+                <c:pt idx="0">
+                  <c:v>9.8206280761888504E-2</c:v>
+                </c:pt>
+                <c:pt idx="1">
+                  <c:v>1.8189222269248809E-2</c:v>
+                </c:pt>
+                <c:pt idx="2">
+                  <c:v>1.1727050098564519E-2</c:v>
+                </c:pt>
+                <c:pt idx="3">
+                  <c:v>1.2566589937520552E-2</c:v>
+                </c:pt>
+                <c:pt idx="4">
+                  <c:v>1.0996880062398752E-2</c:v>
+                </c:pt>
+                <c:pt idx="5">
+                  <c:v>9.8378296365026277E-3</c:v>
+                </c:pt>
+                <c:pt idx="6">
+                  <c:v>1.0053249921801689E-2</c:v>
+                </c:pt>
+                <c:pt idx="7">
+                  <c:v>9.7334947945257131E-3</c:v>
+                </c:pt>
+                <c:pt idx="8">
+                  <c:v>9.7157669131591046E-3</c:v>
+                </c:pt>
+                <c:pt idx="9">
+                  <c:v>9.8206280761888504E-2</c:v>
+                </c:pt>
+                <c:pt idx="10">
+                  <c:v>1.511288927929288E-2</c:v>
+                </c:pt>
+                <c:pt idx="11">
+                  <c:v>2.0308917208766923E-2</c:v>
+                </c:pt>
+                <c:pt idx="12">
+                  <c:v>9.5773266147269998E-2</c:v>
+                </c:pt>
+                <c:pt idx="13">
+                  <c:v>1.0098685716902506E-2</c:v>
+                </c:pt>
+                <c:pt idx="14">
+                  <c:v>9.9203394900863832E-3</c:v>
+                </c:pt>
+                <c:pt idx="15">
+                  <c:v>4.133878809439108E-2</c:v>
+                </c:pt>
+                <c:pt idx="16">
+                  <c:v>1.031108944612911E-2</c:v>
+                </c:pt>
+                <c:pt idx="17">
+                  <c:v>1.0009799567753205E-2</c:v>
+                </c:pt>
+                <c:pt idx="18">
+                  <c:v>9.8180583426804458E-3</c:v>
+                </c:pt>
+                <c:pt idx="19">
+                  <c:v>1.0124021540471363E-2</c:v>
+                </c:pt>
+                <c:pt idx="20">
+                  <c:v>1.3989687576066126E-2</c:v>
+                </c:pt>
+                <c:pt idx="21">
+                  <c:v>1.1003556954226E-2</c:v>
+                </c:pt>
+                <c:pt idx="22">
+                  <c:v>1.1036187841775583E-2</c:v>
+                </c:pt>
+                <c:pt idx="23">
+                  <c:v>9.8206280761888504E-2</c:v>
+                </c:pt>
+                <c:pt idx="24">
+                  <c:v>6.6131459242561377E-2</c:v>
+                </c:pt>
+                <c:pt idx="25">
+                  <c:v>4.3850571554187735E-2</c:v>
+                </c:pt>
+                <c:pt idx="26">
+                  <c:v>2.8525116699608898E-2</c:v>
+                </c:pt>
+                <c:pt idx="27">
+                  <c:v>1.9516756259260571E-2</c:v>
+                </c:pt>
+                <c:pt idx="28">
+                  <c:v>1.5563905740982776E-2</c:v>
+                </c:pt>
+                <c:pt idx="29">
+                  <c:v>1.4804194317832935E-2</c:v>
+                </c:pt>
+                <c:pt idx="30">
+                  <c:v>1.511288927929288E-2</c:v>
+                </c:pt>
+                <c:pt idx="31">
+                  <c:v>1.5676460532216739E-2</c:v>
+                </c:pt>
+                <c:pt idx="32">
+                  <c:v>1.6173676133326438E-2</c:v>
+                </c:pt>
+                <c:pt idx="33">
+                  <c:v>1.663322860437522E-2</c:v>
+                </c:pt>
+                <c:pt idx="34">
+                  <c:v>1.7190226167966435E-2</c:v>
+                </c:pt>
+                <c:pt idx="35">
+                  <c:v>1.7708886072162432E-2</c:v>
+                </c:pt>
+                <c:pt idx="36">
+                  <c:v>1.8189222269248809E-2</c:v>
+                </c:pt>
+                <c:pt idx="37">
+                  <c:v>1.8881455338525359E-2</c:v>
+                </c:pt>
+                <c:pt idx="38">
+                  <c:v>2.0308917208766923E-2</c:v>
+                </c:pt>
+                <c:pt idx="39">
+                  <c:v>9.2574765677843271E-2</c:v>
+                </c:pt>
+                <c:pt idx="40">
+                  <c:v>6.0191323692992217E-2</c:v>
+                </c:pt>
+                <c:pt idx="41">
+                  <c:v>3.7768471123519984E-2</c:v>
+                </c:pt>
+                <c:pt idx="42">
+                  <c:v>2.3319756588357943E-2</c:v>
+                </c:pt>
+                <c:pt idx="43">
+                  <c:v>1.503006479718846E-2</c:v>
+                </c:pt>
+                <c:pt idx="44">
+                  <c:v>1.1727050098564519E-2</c:v>
+                </c:pt>
+                <c:pt idx="45">
+                  <c:v>1.1216239142938719E-2</c:v>
+                </c:pt>
+                <c:pt idx="46">
+                  <c:v>1.1458636878743727E-2</c:v>
+                </c:pt>
+                <c:pt idx="47">
+                  <c:v>1.1759998485794862E-2</c:v>
+                </c:pt>
+                <c:pt idx="48">
+                  <c:v>1.2018368963938098E-2</c:v>
+                </c:pt>
+                <c:pt idx="49">
+                  <c:v>1.2262752841523571E-2</c:v>
+                </c:pt>
+                <c:pt idx="50">
+                  <c:v>1.2566589937520552E-2</c:v>
+                </c:pt>
+                <c:pt idx="51">
+                  <c:v>1.2837947239236102E-2</c:v>
+                </c:pt>
+                <c:pt idx="52">
+                  <c:v>1.306314832455713E-2</c:v>
+                </c:pt>
+                <c:pt idx="53">
+                  <c:v>1.3366241486955121E-2</c:v>
+                </c:pt>
+                <c:pt idx="54">
+                  <c:v>1.4184307699364693E-2</c:v>
+                </c:pt>
+                <c:pt idx="55">
+                  <c:v>9.5773266147269998E-2</c:v>
+                </c:pt>
+                <c:pt idx="56">
+                  <c:v>5.9679005188885671E-2</c:v>
+                </c:pt>
+                <c:pt idx="57">
+                  <c:v>3.6355579157944663E-2</c:v>
+                </c:pt>
+                <c:pt idx="58">
+                  <c:v>2.1984427868712623E-2</c:v>
+                </c:pt>
+                <c:pt idx="59">
+                  <c:v>1.4101366081789092E-2</c:v>
+                </c:pt>
+                <c:pt idx="60">
+                  <c:v>1.1032419669438456E-2</c:v>
+                </c:pt>
+                <c:pt idx="61">
+                  <c:v>1.043636307566582E-2</c:v>
+                </c:pt>
+                <c:pt idx="62">
+                  <c:v>1.0443907875185735E-2</c:v>
+                </c:pt>
+                <c:pt idx="63">
+                  <c:v>1.0447904572344777E-2</c:v>
+                </c:pt>
+                <c:pt idx="64">
+                  <c:v>1.0444367850050059E-2</c:v>
+                </c:pt>
+                <c:pt idx="65">
+                  <c:v>1.0525135856820357E-2</c:v>
+                </c:pt>
+                <c:pt idx="66">
+                  <c:v>1.0685924344694351E-2</c:v>
+                </c:pt>
+                <c:pt idx="67">
+                  <c:v>1.086964580547104E-2</c:v>
+                </c:pt>
+                <c:pt idx="68">
+                  <c:v>1.0996880062398752E-2</c:v>
+                </c:pt>
+                <c:pt idx="69">
+                  <c:v>1.1136870903153219E-2</c:v>
+                </c:pt>
+                <c:pt idx="70">
+                  <c:v>1.1685684063646389E-2</c:v>
+                </c:pt>
+                <c:pt idx="71">
+                  <c:v>6.3020511889635145E-2</c:v>
+                </c:pt>
+                <c:pt idx="72">
+                  <c:v>3.7794376849369218E-2</c:v>
+                </c:pt>
+                <c:pt idx="73">
+                  <c:v>2.2546091967823267E-2</c:v>
+                </c:pt>
+                <c:pt idx="74">
+                  <c:v>1.4416882992019998E-2</c:v>
+                </c:pt>
+                <c:pt idx="75">
+                  <c:v>1.1335378347805434E-2</c:v>
+                </c:pt>
+                <c:pt idx="76">
+                  <c:v>1.05391227782172E-2</c:v>
+                </c:pt>
+                <c:pt idx="77">
+                  <c:v>1.031270349231996E-2</c:v>
+                </c:pt>
+                <c:pt idx="78">
+                  <c:v>1.0098685716902506E-2</c:v>
+                </c:pt>
+                <c:pt idx="79">
+                  <c:v>9.9203394900863832E-3</c:v>
+                </c:pt>
+                <c:pt idx="80">
+                  <c:v>9.8378296365026277E-3</c:v>
+                </c:pt>
+                <c:pt idx="81">
+                  <c:v>9.9012390761289044E-3</c:v>
+                </c:pt>
+                <c:pt idx="82">
+                  <c:v>9.9985021836585617E-3</c:v>
+                </c:pt>
+                <c:pt idx="83">
+                  <c:v>1.0053249921801689E-2</c:v>
+                </c:pt>
+                <c:pt idx="84">
+                  <c:v>1.0156362577954641E-2</c:v>
+                </c:pt>
+                <c:pt idx="85">
+                  <c:v>1.0550970713451039E-2</c:v>
+                </c:pt>
+                <c:pt idx="86">
+                  <c:v>4.133878809439108E-2</c:v>
+                </c:pt>
+                <c:pt idx="87">
+                  <c:v>2.4306228871110051E-2</c:v>
+                </c:pt>
+                <c:pt idx="88">
+                  <c:v>1.5555742726559419E-2</c:v>
+                </c:pt>
+                <c:pt idx="89">
+                  <c:v>1.2059806268172399E-2</c:v>
+                </c:pt>
+                <c:pt idx="90">
+                  <c:v>1.1051601390754062E-2</c:v>
+                </c:pt>
+                <c:pt idx="91">
+                  <c:v>1.0653085517030285E-2</c:v>
+                </c:pt>
+                <c:pt idx="92">
+                  <c:v>1.031108944612911E-2</c:v>
+                </c:pt>
+                <c:pt idx="93">
+                  <c:v>1.0009799567753205E-2</c:v>
+                </c:pt>
+                <c:pt idx="94">
+                  <c:v>9.8180583426804458E-3</c:v>
+                </c:pt>
+                <c:pt idx="95">
+                  <c:v>9.7554163068046089E-3</c:v>
+                </c:pt>
+                <c:pt idx="96">
+                  <c:v>9.7478183994477094E-3</c:v>
+                </c:pt>
+                <c:pt idx="97">
+                  <c:v>9.7334947945257131E-3</c:v>
+                </c:pt>
+                <c:pt idx="98">
+                  <c:v>9.7648819711522328E-3</c:v>
+                </c:pt>
+                <c:pt idx="99">
+                  <c:v>1.0124021540471363E-2</c:v>
+                </c:pt>
+                <c:pt idx="100">
+                  <c:v>2.7003933845909874E-2</c:v>
+                </c:pt>
+                <c:pt idx="101">
+                  <c:v>1.7041151893616064E-2</c:v>
+                </c:pt>
+                <c:pt idx="102">
+                  <c:v>1.2950521157842692E-2</c:v>
+                </c:pt>
+                <c:pt idx="103">
+                  <c:v>1.1626760589056729E-2</c:v>
+                </c:pt>
+                <c:pt idx="104">
+                  <c:v>1.1104620109493925E-2</c:v>
+                </c:pt>
+                <c:pt idx="105">
+                  <c:v>1.0703622761781759E-2</c:v>
+                </c:pt>
+                <c:pt idx="106">
+                  <c:v>1.034361056512819E-2</c:v>
+                </c:pt>
+                <c:pt idx="107">
+                  <c:v>1.0078184929486044E-2</c:v>
+                </c:pt>
+                <c:pt idx="108">
+                  <c:v>9.9201057202189923E-3</c:v>
+                </c:pt>
+                <c:pt idx="109">
+                  <c:v>9.8086123267601341E-3</c:v>
+                </c:pt>
+                <c:pt idx="110">
+                  <c:v>9.7157669131591046E-3</c:v>
+                </c:pt>
+                <c:pt idx="111">
+                  <c:v>9.6958047233786631E-3</c:v>
+                </c:pt>
+                <c:pt idx="112">
+                  <c:v>1.003926107708843E-2</c:v>
+                </c:pt>
+                <c:pt idx="113">
+                  <c:v>1.936398013167704E-2</c:v>
+                </c:pt>
+                <c:pt idx="114">
+                  <c:v>1.4171204989175555E-2</c:v>
+                </c:pt>
+                <c:pt idx="115">
+                  <c:v>1.2224464168804267E-2</c:v>
+                </c:pt>
+                <c:pt idx="116">
+                  <c:v>1.1445202116278237E-2</c:v>
+                </c:pt>
+                <c:pt idx="117">
+                  <c:v>1.0983293256289705E-2</c:v>
+                </c:pt>
+                <c:pt idx="118">
+                  <c:v>1.0644400862045085E-2</c:v>
+                </c:pt>
+                <c:pt idx="119">
+                  <c:v>1.0341526566759249E-2</c:v>
+                </c:pt>
+                <c:pt idx="120">
+                  <c:v>1.0130835707043885E-2</c:v>
+                </c:pt>
+                <c:pt idx="121">
+                  <c:v>9.9580546629270874E-3</c:v>
+                </c:pt>
+                <c:pt idx="122">
+                  <c:v>9.8217667777901578E-3</c:v>
+                </c:pt>
+                <c:pt idx="123">
+                  <c:v>9.8337082294769704E-3</c:v>
+                </c:pt>
+                <c:pt idx="124">
+                  <c:v>1.0233220703424972E-2</c:v>
+                </c:pt>
+                <c:pt idx="125">
+                  <c:v>1.3989687576066126E-2</c:v>
+                </c:pt>
+                <c:pt idx="126">
+                  <c:v>1.2603536826086821E-2</c:v>
+                </c:pt>
+                <c:pt idx="127">
+                  <c:v>1.1860758662245943E-2</c:v>
+                </c:pt>
+                <c:pt idx="128">
+                  <c:v>1.1360810043696948E-2</c:v>
+                </c:pt>
+                <c:pt idx="129">
+                  <c:v>1.1003556954226E-2</c:v>
+                </c:pt>
+                <c:pt idx="130">
+                  <c:v>1.0751386544489991E-2</c:v>
+                </c:pt>
+                <c:pt idx="131">
+                  <c:v>1.0556717090968721E-2</c:v>
+                </c:pt>
+                <c:pt idx="132">
+                  <c:v>1.0460373411049287E-2</c:v>
+                </c:pt>
+                <c:pt idx="133">
+                  <c:v>1.0534378600237339E-2</c:v>
+                </c:pt>
+                <c:pt idx="134">
+                  <c:v>1.1036187841775583E-2</c:v>
+                </c:pt>
+              </c:numCache>
+            </c:numRef>
+          </c:yVal>
+          <c:smooth val="0"/>
+        </c:ser>
+        <c:ser>
+          <c:idx val="1"/>
+          <c:order val="1"/>
+          <c:tx>
+            <c:v>Map 7</c:v>
+          </c:tx>
+          <c:spPr>
+            <a:ln w="28575">
+              <a:noFill/>
+            </a:ln>
+          </c:spPr>
+          <c:marker>
+            <c:symbol val="circle"/>
+            <c:size val="22"/>
+            <c:spPr>
+              <a:noFill/>
+              <a:ln>
+                <a:solidFill>
+                  <a:schemeClr val="tx1">
+                    <a:alpha val="50000"/>
+                  </a:schemeClr>
+                </a:solidFill>
+              </a:ln>
+            </c:spPr>
+          </c:marker>
+          <c:xVal>
+            <c:numRef>
+              <c:f>'Map 7_all_result'!$R$2:$R$136</c:f>
+              <c:numCache>
+                <c:formatCode>0.00E+00</c:formatCode>
+                <c:ptCount val="135"/>
+                <c:pt idx="0">
+                  <c:v>11.114755555555554</c:v>
+                </c:pt>
+                <c:pt idx="1">
+                  <c:v>9.2987555555555552E-3</c:v>
+                </c:pt>
+                <c:pt idx="2">
+                  <c:v>2.1797555555555556E-2</c:v>
+                </c:pt>
+                <c:pt idx="3">
+                  <c:v>1.9153199999999999E-2</c:v>
+                </c:pt>
+                <c:pt idx="4">
+                  <c:v>8.6217333333333326E-3</c:v>
+                </c:pt>
+                <c:pt idx="5">
+                  <c:v>2.1883155555555554E-2</c:v>
+                </c:pt>
+                <c:pt idx="6">
+                  <c:v>9.7064888888888888E-3</c:v>
+                </c:pt>
+                <c:pt idx="7">
+                  <c:v>4.0175822222222227E-2</c:v>
+                </c:pt>
+                <c:pt idx="8">
+                  <c:v>2.079591111111111E-2</c:v>
+                </c:pt>
+                <c:pt idx="9">
+                  <c:v>11.114755555555554</c:v>
+                </c:pt>
+                <c:pt idx="10">
+                  <c:v>4.4389422222222219</c:v>
+                </c:pt>
+                <c:pt idx="11">
+                  <c:v>4.4153555555555553</c:v>
+                </c:pt>
+                <c:pt idx="12">
+                  <c:v>11.11751111111111</c:v>
+                </c:pt>
+                <c:pt idx="13">
+                  <c:v>2.3887777777777775E-2</c:v>
+                </c:pt>
+                <c:pt idx="14">
+                  <c:v>2.2152977777777778</c:v>
+                </c:pt>
+                <c:pt idx="15">
+                  <c:v>6.6720444444444444</c:v>
+                </c:pt>
+                <c:pt idx="16">
+                  <c:v>4.426342222222222</c:v>
+                </c:pt>
+                <c:pt idx="17">
+                  <c:v>4.4355777777777776</c:v>
+                </c:pt>
+                <c:pt idx="18">
+                  <c:v>2.2209644444444443</c:v>
+                </c:pt>
+                <c:pt idx="19">
+                  <c:v>4.4357066666666665</c:v>
+                </c:pt>
+                <c:pt idx="20">
+                  <c:v>4.4347511111111109</c:v>
+                </c:pt>
+                <c:pt idx="21">
+                  <c:v>4.4421999999999997</c:v>
+                </c:pt>
+                <c:pt idx="22">
+                  <c:v>8.1238222222222226E-3</c:v>
+                </c:pt>
+                <c:pt idx="23">
+                  <c:v>11.114755555555554</c:v>
+                </c:pt>
+                <c:pt idx="24">
+                  <c:v>8.8733333333333331</c:v>
+                </c:pt>
+                <c:pt idx="25">
+                  <c:v>6.672533333333333</c:v>
+                </c:pt>
+                <c:pt idx="26">
+                  <c:v>4.4499999999999993</c:v>
+                </c:pt>
+                <c:pt idx="27">
+                  <c:v>2.2171911111111111</c:v>
+                </c:pt>
+                <c:pt idx="28">
+                  <c:v>1.6340266666666669E-2</c:v>
+                </c:pt>
+                <c:pt idx="29">
+                  <c:v>2.2023066666666669</c:v>
+                </c:pt>
+                <c:pt idx="30">
+                  <c:v>4.4389422222222219</c:v>
+                </c:pt>
+                <c:pt idx="31">
+                  <c:v>4.4593333333333334</c:v>
+                </c:pt>
+                <c:pt idx="32">
+                  <c:v>4.4547111111111111</c:v>
+                </c:pt>
+                <c:pt idx="33">
+                  <c:v>2.2351911111111114</c:v>
+                </c:pt>
+                <c:pt idx="34">
+                  <c:v>2.7122755555555558E-2</c:v>
+                </c:pt>
+                <c:pt idx="35">
+                  <c:v>2.2214622222222222</c:v>
+                </c:pt>
+                <c:pt idx="36">
+                  <c:v>9.2987555555555552E-3</c:v>
+                </c:pt>
+                <c:pt idx="37">
+                  <c:v>2.2334000000000001</c:v>
+                </c:pt>
+                <c:pt idx="38">
+                  <c:v>4.4153555555555553</c:v>
+                </c:pt>
+                <c:pt idx="39">
+                  <c:v>11.106400000000001</c:v>
+                </c:pt>
+                <c:pt idx="40">
+                  <c:v>8.9006222222222213</c:v>
+                </c:pt>
+                <c:pt idx="41">
+                  <c:v>6.6627111111111113</c:v>
+                </c:pt>
+                <c:pt idx="42">
+                  <c:v>4.4503555555555554</c:v>
+                </c:pt>
+                <c:pt idx="43">
+                  <c:v>2.2167511111111109</c:v>
+                </c:pt>
+                <c:pt idx="44">
+                  <c:v>2.1797555555555556E-2</c:v>
+                </c:pt>
+                <c:pt idx="45">
+                  <c:v>2.224142222222222</c:v>
+                </c:pt>
+                <c:pt idx="46">
+                  <c:v>2.2197333333333331</c:v>
+                </c:pt>
+                <c:pt idx="47">
+                  <c:v>2.1504088888888891E-2</c:v>
+                </c:pt>
+                <c:pt idx="48">
+                  <c:v>2.2137644444444446</c:v>
+                </c:pt>
+                <c:pt idx="49">
+                  <c:v>2.2374577777777778</c:v>
+                </c:pt>
+                <c:pt idx="50">
+                  <c:v>1.9153199999999999E-2</c:v>
+                </c:pt>
+                <c:pt idx="51">
+                  <c:v>2.2425377777777777</c:v>
+                </c:pt>
+                <c:pt idx="52">
+                  <c:v>4.4363955555555554</c:v>
+                </c:pt>
+                <c:pt idx="53">
+                  <c:v>2.2113155555555557</c:v>
+                </c:pt>
+                <c:pt idx="54">
+                  <c:v>1.2623688888888889E-2</c:v>
+                </c:pt>
+                <c:pt idx="55">
+                  <c:v>11.11751111111111</c:v>
+                </c:pt>
+                <c:pt idx="56">
+                  <c:v>8.8741777777777777</c:v>
+                </c:pt>
+                <c:pt idx="57">
+                  <c:v>6.6447555555555553</c:v>
+                </c:pt>
+                <c:pt idx="58">
+                  <c:v>4.4437511111111112</c:v>
+                </c:pt>
+                <c:pt idx="59">
+                  <c:v>2.234097777777778</c:v>
+                </c:pt>
+                <c:pt idx="60">
+                  <c:v>1.4476577777777777E-2</c:v>
+                </c:pt>
+                <c:pt idx="61">
+                  <c:v>2.2338933333333331</c:v>
+                </c:pt>
+                <c:pt idx="62">
+                  <c:v>4.4439466666666663</c:v>
+                </c:pt>
+                <c:pt idx="63">
+                  <c:v>4.4297555555555554</c:v>
+                </c:pt>
+                <c:pt idx="64">
+                  <c:v>4.4610222222222227</c:v>
+                </c:pt>
+                <c:pt idx="65">
+                  <c:v>2.2308266666666667</c:v>
+                </c:pt>
+                <c:pt idx="66">
+                  <c:v>3.2813466666666666E-2</c:v>
+                </c:pt>
+                <c:pt idx="67">
+                  <c:v>2.2124622222222223</c:v>
+                </c:pt>
+                <c:pt idx="68">
+                  <c:v>8.6217333333333326E-3</c:v>
+                </c:pt>
+                <c:pt idx="69">
+                  <c:v>2.20804</c:v>
+                </c:pt>
+                <c:pt idx="70">
+                  <c:v>4.4102977777777781</c:v>
+                </c:pt>
+                <c:pt idx="71">
+                  <c:v>9.9196444444444438</c:v>
+                </c:pt>
+                <c:pt idx="72">
+                  <c:v>7.9960444444444443</c:v>
+                </c:pt>
+                <c:pt idx="73">
+                  <c:v>6.2861777777777776</c:v>
+                </c:pt>
+                <c:pt idx="74">
+                  <c:v>4.9590666666666667</c:v>
+                </c:pt>
+                <c:pt idx="75">
+                  <c:v>4.4373111111111108</c:v>
+                </c:pt>
+                <c:pt idx="76">
+                  <c:v>4.4361155555555563</c:v>
+                </c:pt>
+                <c:pt idx="77">
+                  <c:v>2.2020622222222226</c:v>
+                </c:pt>
+                <c:pt idx="78">
+                  <c:v>2.3887777777777775E-2</c:v>
+                </c:pt>
+                <c:pt idx="79">
+                  <c:v>2.2152977777777778</c:v>
+                </c:pt>
+                <c:pt idx="80">
+                  <c:v>2.1883155555555554E-2</c:v>
+                </c:pt>
+                <c:pt idx="81">
+                  <c:v>2.2095911111111111</c:v>
+                </c:pt>
+                <c:pt idx="82">
+                  <c:v>2.2113244444444446</c:v>
+                </c:pt>
+                <c:pt idx="83">
+                  <c:v>9.7064888888888888E-3</c:v>
+                </c:pt>
+                <c:pt idx="84">
+                  <c:v>2.2140266666666668</c:v>
+                </c:pt>
+                <c:pt idx="85">
+                  <c:v>2.3863244444444445E-2</c:v>
+                </c:pt>
+                <c:pt idx="86">
+                  <c:v>6.6720444444444444</c:v>
+                </c:pt>
+                <c:pt idx="87">
+                  <c:v>4.4502222222222221</c:v>
+                </c:pt>
+                <c:pt idx="88">
+                  <c:v>2.2360844444444443</c:v>
+                </c:pt>
+                <c:pt idx="89">
+                  <c:v>1.1458266666666668E-2</c:v>
+                </c:pt>
+                <c:pt idx="90">
+                  <c:v>2.228048888888889</c:v>
+                </c:pt>
+                <c:pt idx="91">
+                  <c:v>4.4481333333333337</c:v>
+                </c:pt>
+                <c:pt idx="92">
+                  <c:v>4.426342222222222</c:v>
+                </c:pt>
+                <c:pt idx="93">
+                  <c:v>4.4355777777777776</c:v>
+                </c:pt>
+                <c:pt idx="94">
+                  <c:v>2.2209644444444443</c:v>
+                </c:pt>
+                <c:pt idx="95">
+                  <c:v>2.2788088888888889E-3</c:v>
+                </c:pt>
+                <c:pt idx="96">
+                  <c:v>2.2080355555555555</c:v>
+                </c:pt>
+                <c:pt idx="97">
+                  <c:v>4.0175822222222227E-2</c:v>
+                </c:pt>
+                <c:pt idx="98">
+                  <c:v>2.2065333333333332</c:v>
+                </c:pt>
+                <c:pt idx="99">
+                  <c:v>4.4357066666666665</c:v>
+                </c:pt>
+                <c:pt idx="100">
+                  <c:v>6.2707999999999995</c:v>
+                </c:pt>
+                <c:pt idx="101">
+                  <c:v>4.9554666666666671</c:v>
+                </c:pt>
+                <c:pt idx="102">
+                  <c:v>4.4335377777777776</c:v>
+                </c:pt>
+                <c:pt idx="103">
+                  <c:v>4.4548888888888891</c:v>
+                </c:pt>
+                <c:pt idx="104">
+                  <c:v>2.214377777777778</c:v>
+                </c:pt>
+                <c:pt idx="105">
+                  <c:v>3.1447911111111108E-2</c:v>
+                </c:pt>
+                <c:pt idx="106">
+                  <c:v>2.2131688888888892</c:v>
+                </c:pt>
+                <c:pt idx="107">
+                  <c:v>4.4356400000000002</c:v>
+                </c:pt>
+                <c:pt idx="108">
+                  <c:v>4.4284488888888891</c:v>
+                </c:pt>
+                <c:pt idx="109">
+                  <c:v>2.1965955555555556</c:v>
+                </c:pt>
+                <c:pt idx="110">
+                  <c:v>2.079591111111111E-2</c:v>
+                </c:pt>
+                <c:pt idx="111">
+                  <c:v>2.2038977777777777</c:v>
+                </c:pt>
+                <c:pt idx="112">
+                  <c:v>3.1507155555555555E-2</c:v>
+                </c:pt>
+                <c:pt idx="113">
+                  <c:v>2.2207022222222221</c:v>
+                </c:pt>
+                <c:pt idx="114">
+                  <c:v>3.8455644444444444E-2</c:v>
+                </c:pt>
+                <c:pt idx="115">
+                  <c:v>2.2080577777777779</c:v>
+                </c:pt>
+                <c:pt idx="116">
+                  <c:v>4.4571555555555555</c:v>
+                </c:pt>
+                <c:pt idx="117">
+                  <c:v>4.398533333333333</c:v>
+                </c:pt>
+                <c:pt idx="118">
+                  <c:v>4.4599111111111114</c:v>
+                </c:pt>
+                <c:pt idx="119">
+                  <c:v>2.2226755555555555</c:v>
+                </c:pt>
+                <c:pt idx="120">
+                  <c:v>2.4043733333333331E-2</c:v>
+                </c:pt>
+                <c:pt idx="121">
+                  <c:v>2.2260533333333332</c:v>
+                </c:pt>
+                <c:pt idx="122">
+                  <c:v>4.413462222222222</c:v>
+                </c:pt>
+                <c:pt idx="123">
+                  <c:v>4.9485777777777775</c:v>
+                </c:pt>
+                <c:pt idx="124">
+                  <c:v>4.4259511111111109</c:v>
+                </c:pt>
+                <c:pt idx="125">
+                  <c:v>4.4347511111111109</c:v>
+                </c:pt>
+                <c:pt idx="126">
+                  <c:v>2.2559244444444442</c:v>
+                </c:pt>
+                <c:pt idx="127">
+                  <c:v>1.6402666666666666E-2</c:v>
+                </c:pt>
+                <c:pt idx="128">
+                  <c:v>2.2187422222222222</c:v>
+                </c:pt>
+                <c:pt idx="129">
+                  <c:v>4.4421999999999997</c:v>
+                </c:pt>
+                <c:pt idx="130">
+                  <c:v>4.435795555555555</c:v>
+                </c:pt>
+                <c:pt idx="131">
+                  <c:v>4.9738666666666669</c:v>
+                </c:pt>
+                <c:pt idx="132">
+                  <c:v>4.4615555555555559</c:v>
+                </c:pt>
+                <c:pt idx="133">
+                  <c:v>2.2055155555555555</c:v>
+                </c:pt>
+                <c:pt idx="134">
+                  <c:v>8.1238222222222226E-3</c:v>
+                </c:pt>
+              </c:numCache>
+            </c:numRef>
+          </c:xVal>
+          <c:yVal>
+            <c:numRef>
+              <c:f>'Map 7_all_result'!$Q$2:$Q$136</c:f>
+              <c:numCache>
+                <c:formatCode>0%</c:formatCode>
+                <c:ptCount val="135"/>
+                <c:pt idx="0">
+                  <c:v>0.16869317028783903</c:v>
+                </c:pt>
+                <c:pt idx="1">
+                  <c:v>2.0640578350739524E-2</c:v>
+                </c:pt>
+                <c:pt idx="2">
+                  <c:v>1.2490419626853688E-2</c:v>
+                </c:pt>
+                <c:pt idx="3">
+                  <c:v>1.3256001823508511E-2</c:v>
+                </c:pt>
+                <c:pt idx="4">
+                  <c:v>1.1600038211171308E-2</c:v>
+                </c:pt>
+                <c:pt idx="5">
+                  <c:v>1.0171227690013515E-2</c:v>
+                </c:pt>
+                <c:pt idx="6">
+                  <c:v>1.047459638650749E-2</c:v>
+                </c:pt>
+                <c:pt idx="7">
+                  <c:v>1.0138253844050794E-2</c:v>
+                </c:pt>
+                <c:pt idx="8">
+                  <c:v>1.0299135416923916E-2</c:v>
+                </c:pt>
+                <c:pt idx="9">
+                  <c:v>0.16869317028783903</c:v>
+                </c:pt>
+                <c:pt idx="10">
+                  <c:v>1.9393761544691034E-2</c:v>
+                </c:pt>
+                <c:pt idx="11">
+                  <c:v>2.6181675507928732E-2</c:v>
+                </c:pt>
+                <c:pt idx="12">
+                  <c:v>0.17288345743624173</c:v>
+                </c:pt>
+                <c:pt idx="13">
+                  <c:v>1.1115717833884185E-2</c:v>
+                </c:pt>
+                <c:pt idx="14">
+                  <c:v>1.0520359207774634E-2</c:v>
+                </c:pt>
+                <c:pt idx="15">
+                  <c:v>6.5222413112622751E-2</c:v>
+                </c:pt>
+                <c:pt idx="16">
+                  <c:v>1.1559118072076279E-2</c:v>
+                </c:pt>
+                <c:pt idx="17">
+                  <c:v>1.081694666001258E-2</c:v>
+                </c:pt>
+                <c:pt idx="18">
+                  <c:v>1.0318066758731068E-2</c:v>
+                </c:pt>
+                <c:pt idx="19">
+                  <c:v>1.1127537421853894E-2</c:v>
+                </c:pt>
+                <c:pt idx="20">
+                  <c:v>1.8366372399936697E-2</c:v>
+                </c:pt>
+                <c:pt idx="21">
+                  <c:v>1.3600866132829974E-2</c:v>
+                </c:pt>
+                <c:pt idx="22">
+                  <c:v>1.2794335301256491E-2</c:v>
+                </c:pt>
+                <c:pt idx="23">
+                  <c:v>0.16869317028783903</c:v>
+                </c:pt>
+                <c:pt idx="24">
+                  <c:v>0.10682285418010599</c:v>
+                </c:pt>
+                <c:pt idx="25">
+                  <c:v>6.5441350744331453E-2</c:v>
+                </c:pt>
+                <c:pt idx="26">
+                  <c:v>3.7818342630925553E-2</c:v>
+                </c:pt>
+                <c:pt idx="27">
+                  <c:v>2.2256210943453741E-2</c:v>
+                </c:pt>
+                <c:pt idx="28">
+                  <c:v>1.7350245794214941E-2</c:v>
+                </c:pt>
+                <c:pt idx="29">
+                  <c:v>1.8161177433465979E-2</c:v>
+                </c:pt>
+                <c:pt idx="30">
+                  <c:v>1.9393761544691034E-2</c:v>
+                </c:pt>
+                <c:pt idx="31">
+                  <c:v>1.9806213187570091E-2</c:v>
+                </c:pt>
+                <c:pt idx="32">
+                  <c:v>1.952814445240475E-2</c:v>
+                </c:pt>
+                <c:pt idx="33">
+                  <c:v>1.9097748117186168E-2</c:v>
+                </c:pt>
+                <c:pt idx="34">
+                  <c:v>1.9127019476049723E-2</c:v>
+                </c:pt>
+                <c:pt idx="35">
+                  <c:v>1.9615849029888024E-2</c:v>
+                </c:pt>
+                <c:pt idx="36">
+                  <c:v>2.0640578350739524E-2</c:v>
+                </c:pt>
+                <c:pt idx="37">
+                  <c:v>2.2568118761537356E-2</c:v>
+                </c:pt>
+                <c:pt idx="38">
+                  <c:v>2.6181675507928732E-2</c:v>
+                </c:pt>
+                <c:pt idx="39">
+                  <c:v>0.16485867222441569</c:v>
+                </c:pt>
+                <c:pt idx="40">
+                  <c:v>0.10239899209818915</c:v>
+                </c:pt>
+                <c:pt idx="41">
+                  <c:v>6.0659282420902003E-2</c:v>
+                </c:pt>
+                <c:pt idx="42">
+                  <c:v>3.406644932588352E-2</c:v>
+                </c:pt>
+                <c:pt idx="43">
+                  <c:v>1.8437793017227113E-2</c:v>
+                </c:pt>
+                <c:pt idx="44">
+                  <c:v>1.2490419626853688E-2</c:v>
+                </c:pt>
+                <c:pt idx="45">
+                  <c:v>1.2460619609557713E-2</c:v>
+                </c:pt>
+                <c:pt idx="46">
+                  <c:v>1.3283256993453774E-2</c:v>
+                </c:pt>
+                <c:pt idx="47">
+                  <c:v>1.3523996924051205E-2</c:v>
+                </c:pt>
+                <c:pt idx="48">
+                  <c:v>1.3349258207528034E-2</c:v>
+                </c:pt>
+                <c:pt idx="49">
+                  <c:v>1.3161443250167075E-2</c:v>
+                </c:pt>
+                <c:pt idx="50">
+                  <c:v>1.3256001823508511E-2</c:v>
+                </c:pt>
+                <c:pt idx="51">
+                  <c:v>1.352466445821412E-2</c:v>
+                </c:pt>
+                <c:pt idx="52">
+                  <c:v>1.387734759278581E-2</c:v>
+                </c:pt>
+                <c:pt idx="53">
+                  <c:v>1.4570634885075496E-2</c:v>
+                </c:pt>
+                <c:pt idx="54">
+                  <c:v>1.6478732281680768E-2</c:v>
+                </c:pt>
+                <c:pt idx="55">
+                  <c:v>0.17288345743624173</c:v>
+                </c:pt>
+                <c:pt idx="56">
+                  <c:v>0.10320809917453461</c:v>
+                </c:pt>
+                <c:pt idx="57">
+                  <c:v>5.9961333671399594E-2</c:v>
+                </c:pt>
+                <c:pt idx="58">
+                  <c:v>3.3526076988748092E-2</c:v>
+                </c:pt>
+                <c:pt idx="59">
+                  <c:v>1.8497369303836581E-2</c:v>
+                </c:pt>
+                <c:pt idx="60">
+                  <c:v>1.2430922672795927E-2</c:v>
+                </c:pt>
+                <c:pt idx="61">
+                  <c:v>1.16370274996637E-2</c:v>
+                </c:pt>
+                <c:pt idx="62">
+                  <c:v>1.1821140158028775E-2</c:v>
+                </c:pt>
+                <c:pt idx="63">
+                  <c:v>1.1645431479945057E-2</c:v>
+                </c:pt>
+                <c:pt idx="64">
+                  <c:v>1.1267055700834253E-2</c:v>
+                </c:pt>
+                <c:pt idx="65">
+                  <c:v>1.1080679591046975E-2</c:v>
+                </c:pt>
+                <c:pt idx="66">
+                  <c:v>1.1188425571467299E-2</c:v>
+                </c:pt>
+                <c:pt idx="67">
+                  <c:v>1.143438975973715E-2</c:v>
+                </c:pt>
+                <c:pt idx="68">
+                  <c:v>1.1600038211171308E-2</c:v>
+                </c:pt>
+                <c:pt idx="69">
+                  <c:v>1.1833666025667822E-2</c:v>
+                </c:pt>
+                <c:pt idx="70">
+                  <c:v>1.3016321680945532E-2</c:v>
+                </c:pt>
+                <c:pt idx="71">
+                  <c:v>0.10831163565641017</c:v>
+                </c:pt>
+                <c:pt idx="72">
+                  <c:v>6.1533785005011478E-2</c:v>
+                </c:pt>
+                <c:pt idx="73">
+                  <c:v>3.3860233349538159E-2</c:v>
+                </c:pt>
+                <c:pt idx="74">
+                  <c:v>1.8721601256851461E-2</c:v>
+                </c:pt>
+                <c:pt idx="75">
+                  <c:v>1.2939858035024466E-2</c:v>
+                </c:pt>
+                <c:pt idx="76">
+                  <c:v>1.185531186636159E-2</c:v>
+                </c:pt>
+                <c:pt idx="77">
+                  <c:v>1.1631590268814966E-2</c:v>
+                </c:pt>
+                <c:pt idx="78">
+                  <c:v>1.1115717833884185E-2</c:v>
+                </c:pt>
+                <c:pt idx="79">
+                  <c:v>1.0520359207774634E-2</c:v>
+                </c:pt>
+                <c:pt idx="80">
+                  <c:v>1.0171227690013515E-2</c:v>
+                </c:pt>
+                <c:pt idx="81">
+                  <c:v>1.0200906678460858E-2</c:v>
+                </c:pt>
+                <c:pt idx="82">
+                  <c:v>1.0376796207335148E-2</c:v>
+                </c:pt>
+                <c:pt idx="83">
+                  <c:v>1.047459638650749E-2</c:v>
+                </c:pt>
+                <c:pt idx="84">
+                  <c:v>1.0652693395719693E-2</c:v>
+                </c:pt>
+                <c:pt idx="85">
+                  <c:v>1.1593363661421897E-2</c:v>
+                </c:pt>
+                <c:pt idx="86">
+                  <c:v>6.5222413112622751E-2</c:v>
+                </c:pt>
+                <c:pt idx="87">
+                  <c:v>3.5092424227202865E-2</c:v>
+                </c:pt>
+                <c:pt idx="88">
+                  <c:v>1.95937085178223E-2</c:v>
+                </c:pt>
+                <c:pt idx="89">
+                  <c:v>1.375659123310777E-2</c:v>
+                </c:pt>
+                <c:pt idx="90">
+                  <c:v>1.2625084417300408E-2</c:v>
+                </c:pt>
+                <c:pt idx="91">
+                  <c:v>1.2225627014769039E-2</c:v>
+                </c:pt>
+                <c:pt idx="92">
+                  <c:v>1.1559118072076279E-2</c:v>
+                </c:pt>
+                <c:pt idx="93">
+                  <c:v>1.081694666001258E-2</c:v>
+                </c:pt>
+                <c:pt idx="94">
+                  <c:v>1.0318066758731068E-2</c:v>
+                </c:pt>
+                <c:pt idx="95">
+                  <c:v>1.0158542791339429E-2</c:v>
+                </c:pt>
+                <c:pt idx="96">
+                  <c:v>1.0158880338123583E-2</c:v>
+                </c:pt>
+                <c:pt idx="97">
+                  <c:v>1.0138253844050794E-2</c:v>
+                </c:pt>
+                <c:pt idx="98">
+                  <c:v>1.0222711616320997E-2</c:v>
+                </c:pt>
+                <c:pt idx="99">
+                  <c:v>1.1127537421853894E-2</c:v>
+                </c:pt>
+                <c:pt idx="100">
+                  <c:v>3.7985287470972372E-2</c:v>
+                </c:pt>
+                <c:pt idx="101">
+                  <c:v>2.1186193177965145E-2</c:v>
+                </c:pt>
+                <c:pt idx="102">
+                  <c:v>1.4805051594520193E-2</c:v>
+                </c:pt>
+                <c:pt idx="103">
+                  <c:v>1.3319861936385877E-2</c:v>
+                </c:pt>
+                <c:pt idx="104">
+                  <c:v>1.2812963080130139E-2</c:v>
+                </c:pt>
+                <c:pt idx="105">
+                  <c:v>1.2158193306378465E-2</c:v>
+                </c:pt>
+                <c:pt idx="106">
+                  <c:v>1.145274865624114E-2</c:v>
+                </c:pt>
+                <c:pt idx="107">
+                  <c:v>1.0933984098750616E-2</c:v>
+                </c:pt>
+                <c:pt idx="108">
+                  <c:v>1.0661733812026538E-2</c:v>
+                </c:pt>
+                <c:pt idx="109">
+                  <c:v>1.0492708128344529E-2</c:v>
+                </c:pt>
+                <c:pt idx="110">
+                  <c:v>1.0299135416923916E-2</c:v>
+                </c:pt>
+                <c:pt idx="111">
+                  <c:v>1.0232910111619148E-2</c:v>
+                </c:pt>
+                <c:pt idx="112">
+                  <c:v>1.1010888538613798E-2</c:v>
+                </c:pt>
+                <c:pt idx="113">
+                  <c:v>2.5427843718417605E-2</c:v>
+                </c:pt>
+                <c:pt idx="114">
+                  <c:v>1.696049395510876E-2</c:v>
+                </c:pt>
+                <c:pt idx="115">
+                  <c:v>1.4048021304621728E-2</c:v>
+                </c:pt>
+                <c:pt idx="116">
+                  <c:v>1.3013828598164853E-2</c:v>
+                </c:pt>
+                <c:pt idx="117">
+                  <c:v>1.2363899801335385E-2</c:v>
+                </c:pt>
+                <c:pt idx="118">
+                  <c:v>1.1875470507483837E-2</c:v>
+                </c:pt>
+                <c:pt idx="119">
+                  <c:v>1.1524615352885367E-2</c:v>
+                </c:pt>
+                <c:pt idx="120">
+                  <c:v>1.1324621955665656E-2</c:v>
+                </c:pt>
+                <c:pt idx="121">
+                  <c:v>1.1102849780375351E-2</c:v>
+                </c:pt>
+                <c:pt idx="122">
+                  <c:v>1.0794422980442267E-2</c:v>
+                </c:pt>
+                <c:pt idx="123">
+                  <c:v>1.0612731880385199E-2</c:v>
+                </c:pt>
+                <c:pt idx="124">
+                  <c:v>1.1201499283176822E-2</c:v>
+                </c:pt>
+                <c:pt idx="125">
+                  <c:v>1.8366372399936697E-2</c:v>
+                </c:pt>
+                <c:pt idx="126">
+                  <c:v>1.5750827067199404E-2</c:v>
+                </c:pt>
+                <c:pt idx="127">
+                  <c:v>1.4490832730568334E-2</c:v>
+                </c:pt>
+                <c:pt idx="128">
+                  <c:v>1.3834634556324367E-2</c:v>
+                </c:pt>
+                <c:pt idx="129">
+                  <c:v>1.3600866132829974E-2</c:v>
+                </c:pt>
+                <c:pt idx="130">
+                  <c:v>1.3445074128421799E-2</c:v>
+                </c:pt>
+                <c:pt idx="131">
+                  <c:v>1.324181393408788E-2</c:v>
+                </c:pt>
+                <c:pt idx="132">
+                  <c:v>1.2896866324504794E-2</c:v>
+                </c:pt>
+                <c:pt idx="133">
+                  <c:v>1.2541237222574143E-2</c:v>
+                </c:pt>
+                <c:pt idx="134">
+                  <c:v>1.2794335301256491E-2</c:v>
+                </c:pt>
+              </c:numCache>
+            </c:numRef>
+          </c:yVal>
+          <c:smooth val="0"/>
+        </c:ser>
+        <c:dLbls>
+          <c:showLegendKey val="0"/>
+          <c:showVal val="0"/>
+          <c:showCatName val="0"/>
+          <c:showSerName val="0"/>
+          <c:showPercent val="0"/>
+          <c:showBubbleSize val="0"/>
+        </c:dLbls>
+        <c:axId val="53120384"/>
+        <c:axId val="53123840"/>
+      </c:scatterChart>
+      <c:valAx>
+        <c:axId val="53120384"/>
+        <c:scaling>
+          <c:orientation val="minMax"/>
+          <c:max val="12"/>
+          <c:min val="0"/>
+        </c:scaling>
+        <c:delete val="0"/>
+        <c:axPos val="b"/>
+        <c:numFmt formatCode="#,##0.0" sourceLinked="0"/>
+        <c:majorTickMark val="out"/>
+        <c:minorTickMark val="none"/>
+        <c:tickLblPos val="nextTo"/>
+        <c:crossAx val="53123840"/>
+        <c:crosses val="autoZero"/>
+        <c:crossBetween val="midCat"/>
+        <c:majorUnit val="2.5"/>
+      </c:valAx>
+      <c:valAx>
+        <c:axId val="53123840"/>
+        <c:scaling>
+          <c:orientation val="minMax"/>
+        </c:scaling>
+        <c:delete val="0"/>
+        <c:axPos val="l"/>
+        <c:majorGridlines/>
+        <c:title>
+          <c:tx>
+            <c:rich>
+              <a:bodyPr rot="-5400000" vert="horz"/>
+              <a:lstStyle/>
+              <a:p>
+                <a:pPr>
+                  <a:defRPr/>
+                </a:pPr>
+                <a:r>
+                  <a:rPr lang="en-US"/>
+                  <a:t>Relative overall uncertainty </a:t>
+                </a:r>
+              </a:p>
+            </c:rich>
+          </c:tx>
+          <c:layout>
+            <c:manualLayout>
+              <c:xMode val="edge"/>
+              <c:yMode val="edge"/>
+              <c:x val="5.5555555555555552E-2"/>
+              <c:y val="0.1266204432779236"/>
+            </c:manualLayout>
+          </c:layout>
+          <c:overlay val="0"/>
+        </c:title>
+        <c:numFmt formatCode="0%" sourceLinked="0"/>
+        <c:majorTickMark val="out"/>
+        <c:minorTickMark val="none"/>
+        <c:tickLblPos val="nextTo"/>
+        <c:crossAx val="53120384"/>
+        <c:crosses val="autoZero"/>
+        <c:crossBetween val="midCat"/>
+      </c:valAx>
+    </c:plotArea>
+    <c:legend>
+      <c:legendPos val="r"/>
+      <c:layout>
+        <c:manualLayout>
+          <c:xMode val="edge"/>
+          <c:yMode val="edge"/>
+          <c:x val="0.22637468253913928"/>
+          <c:y val="6.7754811898512679E-2"/>
+          <c:w val="0.16588582677165353"/>
+          <c:h val="0.17930519101778944"/>
+        </c:manualLayout>
+      </c:layout>
+      <c:overlay val="0"/>
+      <c:spPr>
+        <a:solidFill>
+          <a:schemeClr val="bg1">
+            <a:alpha val="80000"/>
+          </a:schemeClr>
+        </a:solidFill>
+      </c:spPr>
+    </c:legend>
+    <c:plotVisOnly val="1"/>
+    <c:dispBlanksAs val="gap"/>
+    <c:showDLblsOverMax val="0"/>
+  </c:chart>
+  <c:spPr>
+    <a:ln>
+      <a:noFill/>
+    </a:ln>
+  </c:spPr>
+  <c:txPr>
+    <a:bodyPr/>
+    <a:lstStyle/>
+    <a:p>
+      <a:pPr>
+        <a:defRPr sz="2500">
+          <a:latin typeface="Garamond" panose="02020404030301010803" pitchFamily="18" charset="0"/>
+        </a:defRPr>
+      </a:pPr>
+      <a:endParaRPr lang="en-US"/>
+    </a:p>
+  </c:txPr>
+  <c:externalData r:id="rId1">
+    <c:autoUpdate val="0"/>
+  </c:externalData>
+  <c:userShapes r:id="rId2"/>
+</c:chartSpace>
+</file>
+
+<file path=ppt/drawings/drawing1.xml><?xml version="1.0" encoding="utf-8"?>
+<c:userShapes xmlns:c="http://schemas.openxmlformats.org/drawingml/2006/chart">
+  <cdr:relSizeAnchor xmlns:cdr="http://schemas.openxmlformats.org/drawingml/2006/chartDrawing">
+    <cdr:from>
+      <cdr:x>0.02336</cdr:x>
+      <cdr:y>0.82473</cdr:y>
+    </cdr:from>
+    <cdr:to>
+      <cdr:x>0.99836</cdr:x>
+      <cdr:y>0.97778</cdr:y>
+    </cdr:to>
+    <cdr:sp macro="" textlink="">
+      <cdr:nvSpPr>
+        <cdr:cNvPr id="3" name="TextBox 2"/>
+        <cdr:cNvSpPr txBox="1"/>
+      </cdr:nvSpPr>
+      <cdr:spPr>
+        <a:xfrm xmlns:a="http://schemas.openxmlformats.org/drawingml/2006/main">
+          <a:off x="213575" y="5655972"/>
+          <a:ext cx="8915400" cy="1049628"/>
+        </a:xfrm>
+        <a:prstGeom xmlns:a="http://schemas.openxmlformats.org/drawingml/2006/main" prst="rect">
+          <a:avLst/>
+        </a:prstGeom>
+      </cdr:spPr>
+      <cdr:txBody>
+        <a:bodyPr xmlns:a="http://schemas.openxmlformats.org/drawingml/2006/main" vertOverflow="clip" wrap="none" rtlCol="0"/>
+        <a:lstStyle xmlns:a="http://schemas.openxmlformats.org/drawingml/2006/main"/>
+        <a:p xmlns:a="http://schemas.openxmlformats.org/drawingml/2006/main">
+          <a:pPr marL="0" marR="0" indent="0" algn="ctr" defTabSz="914400" rtl="0" eaLnBrk="1" fontAlgn="auto" latinLnBrk="0" hangingPunct="1">
+            <a:lnSpc>
+              <a:spcPct val="100000"/>
+            </a:lnSpc>
+            <a:spcBef>
+              <a:spcPts val="0"/>
+            </a:spcBef>
+            <a:spcAft>
+              <a:spcPts val="0"/>
+            </a:spcAft>
+            <a:buClrTx/>
+            <a:buSzTx/>
+            <a:buFontTx/>
+            <a:buNone/>
+            <a:tabLst/>
+            <a:defRPr/>
+          </a:pPr>
+          <a:r>
+            <a:rPr lang="en-US" sz="2500" b="1" i="0" baseline="0" dirty="0">
+              <a:effectLst/>
+              <a:latin typeface="Garamond" panose="02020404030301010803" pitchFamily="18" charset="0"/>
+              <a:ea typeface="+mn-ea"/>
+              <a:cs typeface="+mn-cs"/>
+            </a:rPr>
+            <a:t>Minimum distance from nearest point of training</a:t>
+          </a:r>
+          <a:br>
+            <a:rPr lang="en-US" sz="2500" b="1" i="0" baseline="0" dirty="0">
+              <a:effectLst/>
+              <a:latin typeface="Garamond" panose="02020404030301010803" pitchFamily="18" charset="0"/>
+              <a:ea typeface="+mn-ea"/>
+              <a:cs typeface="+mn-cs"/>
+            </a:rPr>
+          </a:br>
+          <a:r>
+            <a:rPr lang="en-US" sz="2500" b="1" i="0" baseline="0" dirty="0">
+              <a:effectLst/>
+              <a:latin typeface="Garamond" panose="02020404030301010803" pitchFamily="18" charset="0"/>
+              <a:ea typeface="+mn-ea"/>
+              <a:cs typeface="+mn-cs"/>
+            </a:rPr>
+            <a:t>data [°C]</a:t>
+          </a:r>
+          <a:endParaRPr lang="en-US" sz="2500" dirty="0">
+            <a:latin typeface="Garamond" panose="02020404030301010803" pitchFamily="18" charset="0"/>
+          </a:endParaRPr>
+        </a:p>
+      </cdr:txBody>
+    </cdr:sp>
+  </cdr:relSizeAnchor>
+</c:userShapes>
 </file>
 
 <file path=ppt/slideLayouts/slideLayout1.xml><?xml version="1.0" encoding="utf-8"?>
@@ -304,7 +2251,7 @@
           <a:p>
             <a:fld id="{987A5A01-F4F1-466C-A6C7-6D43425C9F0D}" type="datetimeFigureOut">
               <a:rPr lang="en-US" smtClean="0"/>
-              <a:t>2/8/2015</a:t>
+              <a:t>2/9/2015</a:t>
             </a:fld>
             <a:endParaRPr lang="en-US"/>
           </a:p>
@@ -474,7 +2421,7 @@
           <a:p>
             <a:fld id="{987A5A01-F4F1-466C-A6C7-6D43425C9F0D}" type="datetimeFigureOut">
               <a:rPr lang="en-US" smtClean="0"/>
-              <a:t>2/8/2015</a:t>
+              <a:t>2/9/2015</a:t>
             </a:fld>
             <a:endParaRPr lang="en-US"/>
           </a:p>
@@ -654,7 +2601,7 @@
           <a:p>
             <a:fld id="{987A5A01-F4F1-466C-A6C7-6D43425C9F0D}" type="datetimeFigureOut">
               <a:rPr lang="en-US" smtClean="0"/>
-              <a:t>2/8/2015</a:t>
+              <a:t>2/9/2015</a:t>
             </a:fld>
             <a:endParaRPr lang="en-US"/>
           </a:p>
@@ -824,7 +2771,7 @@
           <a:p>
             <a:fld id="{987A5A01-F4F1-466C-A6C7-6D43425C9F0D}" type="datetimeFigureOut">
               <a:rPr lang="en-US" smtClean="0"/>
-              <a:t>2/8/2015</a:t>
+              <a:t>2/9/2015</a:t>
             </a:fld>
             <a:endParaRPr lang="en-US"/>
           </a:p>
@@ -1070,7 +3017,7 @@
           <a:p>
             <a:fld id="{987A5A01-F4F1-466C-A6C7-6D43425C9F0D}" type="datetimeFigureOut">
               <a:rPr lang="en-US" smtClean="0"/>
-              <a:t>2/8/2015</a:t>
+              <a:t>2/9/2015</a:t>
             </a:fld>
             <a:endParaRPr lang="en-US"/>
           </a:p>
@@ -1358,7 +3305,7 @@
           <a:p>
             <a:fld id="{987A5A01-F4F1-466C-A6C7-6D43425C9F0D}" type="datetimeFigureOut">
               <a:rPr lang="en-US" smtClean="0"/>
-              <a:t>2/8/2015</a:t>
+              <a:t>2/9/2015</a:t>
             </a:fld>
             <a:endParaRPr lang="en-US"/>
           </a:p>
@@ -1780,7 +3727,7 @@
           <a:p>
             <a:fld id="{987A5A01-F4F1-466C-A6C7-6D43425C9F0D}" type="datetimeFigureOut">
               <a:rPr lang="en-US" smtClean="0"/>
-              <a:t>2/8/2015</a:t>
+              <a:t>2/9/2015</a:t>
             </a:fld>
             <a:endParaRPr lang="en-US"/>
           </a:p>
@@ -1898,7 +3845,7 @@
           <a:p>
             <a:fld id="{987A5A01-F4F1-466C-A6C7-6D43425C9F0D}" type="datetimeFigureOut">
               <a:rPr lang="en-US" smtClean="0"/>
-              <a:t>2/8/2015</a:t>
+              <a:t>2/9/2015</a:t>
             </a:fld>
             <a:endParaRPr lang="en-US"/>
           </a:p>
@@ -1993,7 +3940,7 @@
           <a:p>
             <a:fld id="{987A5A01-F4F1-466C-A6C7-6D43425C9F0D}" type="datetimeFigureOut">
               <a:rPr lang="en-US" smtClean="0"/>
-              <a:t>2/8/2015</a:t>
+              <a:t>2/9/2015</a:t>
             </a:fld>
             <a:endParaRPr lang="en-US"/>
           </a:p>
@@ -2270,7 +4217,7 @@
           <a:p>
             <a:fld id="{987A5A01-F4F1-466C-A6C7-6D43425C9F0D}" type="datetimeFigureOut">
               <a:rPr lang="en-US" smtClean="0"/>
-              <a:t>2/8/2015</a:t>
+              <a:t>2/9/2015</a:t>
             </a:fld>
             <a:endParaRPr lang="en-US"/>
           </a:p>
@@ -2523,7 +4470,7 @@
           <a:p>
             <a:fld id="{987A5A01-F4F1-466C-A6C7-6D43425C9F0D}" type="datetimeFigureOut">
               <a:rPr lang="en-US" smtClean="0"/>
-              <a:t>2/8/2015</a:t>
+              <a:t>2/9/2015</a:t>
             </a:fld>
             <a:endParaRPr lang="en-US"/>
           </a:p>
@@ -2736,7 +4683,7 @@
           <a:p>
             <a:fld id="{987A5A01-F4F1-466C-A6C7-6D43425C9F0D}" type="datetimeFigureOut">
               <a:rPr lang="en-US" smtClean="0"/>
-              <a:t>2/8/2015</a:t>
+              <a:t>2/9/2015</a:t>
             </a:fld>
             <a:endParaRPr lang="en-US"/>
           </a:p>
@@ -3111,30 +5058,30 @@
           <a:chExt cx="0" cy="0"/>
         </a:xfrm>
       </p:grpSpPr>
-      <p:pic>
-        <p:nvPicPr>
-          <p:cNvPr id="3" name="Picture 2"/>
-          <p:cNvPicPr>
-            <a:picLocks noChangeAspect="1"/>
-          </p:cNvPicPr>
-          <p:nvPr/>
-        </p:nvPicPr>
-        <p:blipFill>
-          <a:blip r:embed="rId2"/>
-          <a:stretch>
-            <a:fillRect/>
-          </a:stretch>
-        </p:blipFill>
-        <p:spPr>
-          <a:xfrm>
-            <a:off x="0" y="0"/>
-            <a:ext cx="9143999" cy="6858000"/>
-          </a:xfrm>
-          <a:prstGeom prst="rect">
-            <a:avLst/>
-          </a:prstGeom>
-        </p:spPr>
-      </p:pic>
+      <p:graphicFrame>
+        <p:nvGraphicFramePr>
+          <p:cNvPr id="4" name="Chart 3"/>
+          <p:cNvGraphicFramePr>
+            <a:graphicFrameLocks/>
+          </p:cNvGraphicFramePr>
+          <p:nvPr>
+            <p:extLst>
+              <p:ext uri="{D42A27DB-BD31-4B8C-83A1-F6EECF244321}">
+                <p14:modId xmlns:p14="http://schemas.microsoft.com/office/powerpoint/2010/main" val="448199435"/>
+              </p:ext>
+            </p:extLst>
+          </p:nvPr>
+        </p:nvGraphicFramePr>
+        <p:xfrm>
+          <a:off x="8586" y="-17172"/>
+          <a:ext cx="9144000" cy="6858000"/>
+        </p:xfrm>
+        <a:graphic>
+          <a:graphicData uri="http://schemas.openxmlformats.org/drawingml/2006/chart">
+            <c:chart xmlns:c="http://schemas.openxmlformats.org/drawingml/2006/chart" xmlns:r="http://schemas.openxmlformats.org/officeDocument/2006/relationships" r:id="rId2"/>
+          </a:graphicData>
+        </a:graphic>
+      </p:graphicFrame>
     </p:spTree>
     <p:extLst>
       <p:ext uri="{BB962C8B-B14F-4D97-AF65-F5344CB8AC3E}">

</xml_diff>